<commit_message>
Reserva e carrinho no pptx, e correções no js
</commit_message>
<xml_diff>
--- a/Site/Acaiá Coffee Shop.pptx
+++ b/Site/Acaiá Coffee Shop.pptx
@@ -29256,7 +29256,7 @@
               </a:tabLst>
             </a:pPr>
             <a:r>
-              <a:rPr lang="pt-BR" sz="2000" b="0" strike="noStrike" spc="-1">
+              <a:rPr lang="pt-BR" sz="2000" b="0" strike="noStrike" spc="-1" dirty="0">
                 <a:solidFill>
                   <a:srgbClr val="FFFFFF"/>
                 </a:solidFill>
@@ -29278,7 +29278,7 @@
               </a:tabLst>
             </a:pPr>
             <a:r>
-              <a:rPr lang="pt-BR" sz="2000" b="0" strike="noStrike" spc="-1">
+              <a:rPr lang="pt-BR" sz="2000" b="0" strike="noStrike" spc="-1" dirty="0">
                 <a:solidFill>
                   <a:srgbClr val="FFFFFF"/>
                 </a:solidFill>
@@ -29300,7 +29300,7 @@
               </a:tabLst>
             </a:pPr>
             <a:r>
-              <a:rPr lang="pt-BR" sz="2000" b="0" strike="noStrike" spc="-1">
+              <a:rPr lang="pt-BR" sz="2000" b="0" strike="noStrike" spc="-1" dirty="0">
                 <a:solidFill>
                   <a:srgbClr val="FFFFFF"/>
                 </a:solidFill>
@@ -29322,7 +29322,7 @@
               </a:tabLst>
             </a:pPr>
             <a:r>
-              <a:rPr lang="pt-BR" sz="2000" b="0" strike="noStrike" spc="-1">
+              <a:rPr lang="pt-BR" sz="2000" b="0" strike="noStrike" spc="-1" dirty="0">
                 <a:solidFill>
                   <a:srgbClr val="FFFFFF"/>
                 </a:solidFill>
@@ -29344,13 +29344,40 @@
               </a:tabLst>
             </a:pPr>
             <a:r>
-              <a:rPr lang="pt-BR" sz="2000" b="0" strike="noStrike" spc="-1">
+              <a:rPr lang="pt-BR" sz="2000" b="0" strike="noStrike" spc="-1" dirty="0" err="1">
                 <a:solidFill>
                   <a:srgbClr val="FFFFFF"/>
                 </a:solidFill>
                 <a:latin typeface="Avenir Next LT Pro Light"/>
               </a:rPr>
-              <a:t>Doodle art </a:t>
+              <a:t>Doodle</a:t>
+            </a:r>
+            <a:r>
+              <a:rPr lang="pt-BR" sz="2000" b="0" strike="noStrike" spc="-1" dirty="0">
+                <a:solidFill>
+                  <a:srgbClr val="FFFFFF"/>
+                </a:solidFill>
+                <a:latin typeface="Avenir Next LT Pro Light"/>
+              </a:rPr>
+              <a:t> </a:t>
+            </a:r>
+            <a:r>
+              <a:rPr lang="pt-BR" sz="2000" b="0" strike="noStrike" spc="-1" dirty="0" err="1">
+                <a:solidFill>
+                  <a:srgbClr val="FFFFFF"/>
+                </a:solidFill>
+                <a:latin typeface="Avenir Next LT Pro Light"/>
+              </a:rPr>
+              <a:t>art</a:t>
+            </a:r>
+            <a:r>
+              <a:rPr lang="pt-BR" sz="2000" b="0" strike="noStrike" spc="-1" dirty="0">
+                <a:solidFill>
+                  <a:srgbClr val="FFFFFF"/>
+                </a:solidFill>
+                <a:latin typeface="Avenir Next LT Pro Light"/>
+              </a:rPr>
+              <a:t> </a:t>
             </a:r>
           </a:p>
           <a:p>
@@ -29365,7 +29392,7 @@
                 <a:tab pos="0" algn="l"/>
               </a:tabLst>
             </a:pPr>
-            <a:endParaRPr lang="pt-BR" sz="2000" b="0" strike="noStrike" spc="-1">
+            <a:endParaRPr lang="pt-BR" sz="2000" b="0" strike="noStrike" spc="-1" dirty="0">
               <a:solidFill>
                 <a:srgbClr val="FFFFFF"/>
               </a:solidFill>
@@ -29384,7 +29411,7 @@
                 <a:tab pos="0" algn="l"/>
               </a:tabLst>
             </a:pPr>
-            <a:endParaRPr lang="pt-BR" sz="2000" b="0" strike="noStrike" spc="-1">
+            <a:endParaRPr lang="pt-BR" sz="2000" b="0" strike="noStrike" spc="-1" dirty="0">
               <a:solidFill>
                 <a:srgbClr val="FFFFFF"/>
               </a:solidFill>
@@ -30647,6 +30674,260 @@
           </a:p>
         </p:txBody>
       </p:sp>
+      <p:pic>
+        <p:nvPicPr>
+          <p:cNvPr id="11" name="Imagem 10">
+            <a:extLst>
+              <a:ext uri="{FF2B5EF4-FFF2-40B4-BE49-F238E27FC236}">
+                <a16:creationId xmlns:a16="http://schemas.microsoft.com/office/drawing/2014/main" id="{32833172-8C64-4566-A141-98F548E82660}"/>
+              </a:ext>
+            </a:extLst>
+          </p:cNvPr>
+          <p:cNvPicPr>
+            <a:picLocks noChangeAspect="1"/>
+          </p:cNvPicPr>
+          <p:nvPr/>
+        </p:nvPicPr>
+        <p:blipFill>
+          <a:blip r:embed="rId2"/>
+          <a:stretch>
+            <a:fillRect/>
+          </a:stretch>
+        </p:blipFill>
+        <p:spPr>
+          <a:xfrm>
+            <a:off x="7580314" y="158237"/>
+            <a:ext cx="4401164" cy="2457793"/>
+          </a:xfrm>
+          <a:prstGeom prst="rect">
+            <a:avLst/>
+          </a:prstGeom>
+        </p:spPr>
+      </p:pic>
+      <p:pic>
+        <p:nvPicPr>
+          <p:cNvPr id="13" name="Imagem 12">
+            <a:extLst>
+              <a:ext uri="{FF2B5EF4-FFF2-40B4-BE49-F238E27FC236}">
+                <a16:creationId xmlns:a16="http://schemas.microsoft.com/office/drawing/2014/main" id="{324DD04A-3286-4BD5-988B-688E1B480B9C}"/>
+              </a:ext>
+            </a:extLst>
+          </p:cNvPr>
+          <p:cNvPicPr>
+            <a:picLocks noChangeAspect="1"/>
+          </p:cNvPicPr>
+          <p:nvPr/>
+        </p:nvPicPr>
+        <p:blipFill>
+          <a:blip r:embed="rId3"/>
+          <a:stretch>
+            <a:fillRect/>
+          </a:stretch>
+        </p:blipFill>
+        <p:spPr>
+          <a:xfrm>
+            <a:off x="7932788" y="2889523"/>
+            <a:ext cx="3696216" cy="2534004"/>
+          </a:xfrm>
+          <a:prstGeom prst="rect">
+            <a:avLst/>
+          </a:prstGeom>
+        </p:spPr>
+      </p:pic>
+      <p:sp>
+        <p:nvSpPr>
+          <p:cNvPr id="14" name="CaixaDeTexto 13">
+            <a:extLst>
+              <a:ext uri="{FF2B5EF4-FFF2-40B4-BE49-F238E27FC236}">
+                <a16:creationId xmlns:a16="http://schemas.microsoft.com/office/drawing/2014/main" id="{5EC67E09-702F-4F3C-8F43-988C62E9702D}"/>
+              </a:ext>
+            </a:extLst>
+          </p:cNvPr>
+          <p:cNvSpPr txBox="1"/>
+          <p:nvPr/>
+        </p:nvSpPr>
+        <p:spPr>
+          <a:xfrm>
+            <a:off x="245660" y="2679197"/>
+            <a:ext cx="8284191" cy="2954655"/>
+          </a:xfrm>
+          <a:prstGeom prst="rect">
+            <a:avLst/>
+          </a:prstGeom>
+          <a:noFill/>
+        </p:spPr>
+        <p:txBody>
+          <a:bodyPr wrap="square" rtlCol="0">
+            <a:spAutoFit/>
+          </a:bodyPr>
+          <a:lstStyle/>
+          <a:p>
+            <a:pPr marL="285750" indent="-285750">
+              <a:buFont typeface="Wingdings" panose="05000000000000000000" pitchFamily="2" charset="2"/>
+              <a:buChar char="q"/>
+            </a:pPr>
+            <a:r>
+              <a:rPr lang="pt-BR" sz="2400" dirty="0">
+                <a:solidFill>
+                  <a:schemeClr val="bg1"/>
+                </a:solidFill>
+              </a:rPr>
+              <a:t> </a:t>
+            </a:r>
+            <a:r>
+              <a:rPr lang="pt-BR" sz="2400" dirty="0">
+                <a:solidFill>
+                  <a:schemeClr val="bg1"/>
+                </a:solidFill>
+                <a:latin typeface="Avenir Next LT Pro Light" panose="020B0304020202020204" pitchFamily="34" charset="0"/>
+              </a:rPr>
+              <a:t>O carrinho é feito da maneira </a:t>
+            </a:r>
+            <a:r>
+              <a:rPr lang="pt-BR" sz="2400" b="1" i="1" dirty="0">
+                <a:solidFill>
+                  <a:schemeClr val="bg1"/>
+                </a:solidFill>
+                <a:latin typeface="Avenir Next LT Pro Light" panose="020B0304020202020204" pitchFamily="34" charset="0"/>
+              </a:rPr>
+              <a:t>pop </a:t>
+            </a:r>
+            <a:r>
+              <a:rPr lang="pt-BR" sz="2400" b="1" i="1" dirty="0" err="1">
+                <a:solidFill>
+                  <a:schemeClr val="bg1"/>
+                </a:solidFill>
+                <a:latin typeface="Avenir Next LT Pro Light" panose="020B0304020202020204" pitchFamily="34" charset="0"/>
+              </a:rPr>
+              <a:t>up</a:t>
+            </a:r>
+            <a:r>
+              <a:rPr lang="pt-BR" sz="2400" b="1" i="1" dirty="0">
+                <a:solidFill>
+                  <a:schemeClr val="bg1"/>
+                </a:solidFill>
+                <a:latin typeface="Avenir Next LT Pro Light" panose="020B0304020202020204" pitchFamily="34" charset="0"/>
+              </a:rPr>
+              <a:t> </a:t>
+            </a:r>
+            <a:r>
+              <a:rPr lang="pt-BR" sz="2400" dirty="0">
+                <a:solidFill>
+                  <a:schemeClr val="bg1"/>
+                </a:solidFill>
+                <a:latin typeface="Avenir Next LT Pro Light" panose="020B0304020202020204" pitchFamily="34" charset="0"/>
+              </a:rPr>
+              <a:t>por meio do Framework </a:t>
+            </a:r>
+            <a:r>
+              <a:rPr lang="pt-BR" sz="2400" b="1" i="1" dirty="0" err="1">
+                <a:solidFill>
+                  <a:schemeClr val="bg1"/>
+                </a:solidFill>
+                <a:latin typeface="Avenir Next LT Pro Light" panose="020B0304020202020204" pitchFamily="34" charset="0"/>
+              </a:rPr>
+              <a:t>SweetAlert</a:t>
+            </a:r>
+            <a:r>
+              <a:rPr lang="pt-BR" sz="2400" dirty="0">
+                <a:solidFill>
+                  <a:schemeClr val="bg1"/>
+                </a:solidFill>
+                <a:latin typeface="Avenir Next LT Pro Light" panose="020B0304020202020204" pitchFamily="34" charset="0"/>
+              </a:rPr>
+              <a:t> que permite criar janelas interativas.</a:t>
+            </a:r>
+          </a:p>
+          <a:p>
+            <a:pPr marL="285750" indent="-285750">
+              <a:buFont typeface="Wingdings" panose="05000000000000000000" pitchFamily="2" charset="2"/>
+              <a:buChar char="q"/>
+            </a:pPr>
+            <a:endParaRPr lang="pt-BR" sz="2400" dirty="0">
+              <a:solidFill>
+                <a:schemeClr val="bg1"/>
+              </a:solidFill>
+              <a:latin typeface="Avenir Next LT Pro Light" panose="020B0304020202020204" pitchFamily="34" charset="0"/>
+            </a:endParaRPr>
+          </a:p>
+          <a:p>
+            <a:pPr marL="285750" indent="-285750">
+              <a:buFont typeface="Wingdings" panose="05000000000000000000" pitchFamily="2" charset="2"/>
+              <a:buChar char="q"/>
+            </a:pPr>
+            <a:r>
+              <a:rPr lang="pt-BR" sz="2400" dirty="0">
+                <a:solidFill>
+                  <a:schemeClr val="bg1"/>
+                </a:solidFill>
+                <a:latin typeface="Avenir Next LT Pro Light" panose="020B0304020202020204" pitchFamily="34" charset="0"/>
+              </a:rPr>
+              <a:t> Visualização </a:t>
+            </a:r>
+            <a:r>
+              <a:rPr lang="pt-BR" sz="2400" b="1" dirty="0">
+                <a:solidFill>
+                  <a:schemeClr val="bg1"/>
+                </a:solidFill>
+                <a:latin typeface="Avenir Next LT Pro Light" panose="020B0304020202020204" pitchFamily="34" charset="0"/>
+              </a:rPr>
+              <a:t>rápida </a:t>
+            </a:r>
+            <a:r>
+              <a:rPr lang="pt-BR" sz="2400" dirty="0">
+                <a:solidFill>
+                  <a:schemeClr val="bg1"/>
+                </a:solidFill>
+                <a:latin typeface="Avenir Next LT Pro Light" panose="020B0304020202020204" pitchFamily="34" charset="0"/>
+              </a:rPr>
+              <a:t>e </a:t>
+            </a:r>
+            <a:r>
+              <a:rPr lang="pt-BR" sz="2400" b="1" dirty="0">
+                <a:solidFill>
+                  <a:schemeClr val="bg1"/>
+                </a:solidFill>
+                <a:latin typeface="Avenir Next LT Pro Light" panose="020B0304020202020204" pitchFamily="34" charset="0"/>
+              </a:rPr>
+              <a:t>simples.</a:t>
+            </a:r>
+          </a:p>
+          <a:p>
+            <a:endParaRPr lang="pt-BR" sz="2400" dirty="0">
+              <a:solidFill>
+                <a:schemeClr val="bg1"/>
+              </a:solidFill>
+              <a:latin typeface="Avenir Next LT Pro Light" panose="020B0304020202020204" pitchFamily="34" charset="0"/>
+            </a:endParaRPr>
+          </a:p>
+          <a:p>
+            <a:pPr marL="285750" indent="-285750">
+              <a:buFont typeface="Wingdings" panose="05000000000000000000" pitchFamily="2" charset="2"/>
+              <a:buChar char="q"/>
+            </a:pPr>
+            <a:r>
+              <a:rPr lang="pt-BR" sz="2400" dirty="0">
+                <a:solidFill>
+                  <a:schemeClr val="bg1"/>
+                </a:solidFill>
+                <a:latin typeface="Avenir Next LT Pro Light" panose="020B0304020202020204" pitchFamily="34" charset="0"/>
+              </a:rPr>
+              <a:t> Pouco esforço computacional por estar no cliente</a:t>
+            </a:r>
+            <a:r>
+              <a:rPr lang="pt-BR" sz="2400" dirty="0">
+                <a:solidFill>
+                  <a:schemeClr val="bg1"/>
+                </a:solidFill>
+              </a:rPr>
+              <a:t>.</a:t>
+            </a:r>
+          </a:p>
+          <a:p>
+            <a:endParaRPr lang="pt-BR" dirty="0"/>
+          </a:p>
+        </p:txBody>
+      </p:sp>
     </p:spTree>
   </p:cSld>
   <p:clrMapOvr>
@@ -30773,7 +31054,7 @@
         </p:nvSpPr>
         <p:spPr>
           <a:xfrm>
-            <a:off x="853560" y="1823760"/>
+            <a:off x="848340" y="2507040"/>
             <a:ext cx="10495080" cy="4350960"/>
           </a:xfrm>
           <a:prstGeom prst="rect">
@@ -30790,15 +31071,144 @@
           </a:bodyPr>
           <a:lstStyle/>
           <a:p>
-            <a:endParaRPr lang="pt-BR" sz="2800" b="0" strike="noStrike" spc="-1">
-              <a:solidFill>
-                <a:srgbClr val="FFFFFF"/>
-              </a:solidFill>
-              <a:latin typeface="Avenir Next LT Pro Light"/>
-            </a:endParaRPr>
-          </a:p>
-        </p:txBody>
-      </p:sp>
+            <a:pPr marL="457200" indent="-457200">
+              <a:buFont typeface="Wingdings" panose="05000000000000000000" pitchFamily="2" charset="2"/>
+              <a:buChar char="q"/>
+            </a:pPr>
+            <a:r>
+              <a:rPr lang="pt-BR" sz="2800" b="0" strike="noStrike" spc="-1" dirty="0">
+                <a:solidFill>
+                  <a:srgbClr val="FFFFFF"/>
+                </a:solidFill>
+                <a:latin typeface="Avenir Next LT Pro Light"/>
+              </a:rPr>
+              <a:t>Uso da API do </a:t>
+            </a:r>
+            <a:r>
+              <a:rPr lang="pt-BR" sz="2800" b="1" i="1" spc="-1" dirty="0" err="1">
+                <a:solidFill>
+                  <a:srgbClr val="FFFFFF"/>
+                </a:solidFill>
+                <a:latin typeface="Avenir Next LT Pro Light"/>
+              </a:rPr>
+              <a:t>T</a:t>
+            </a:r>
+            <a:r>
+              <a:rPr lang="pt-BR" sz="2800" b="1" i="1" strike="noStrike" spc="-1" dirty="0" err="1">
+                <a:solidFill>
+                  <a:srgbClr val="FFFFFF"/>
+                </a:solidFill>
+                <a:latin typeface="Avenir Next LT Pro Light"/>
+              </a:rPr>
+              <a:t>elegram</a:t>
+            </a:r>
+            <a:r>
+              <a:rPr lang="pt-BR" sz="2800" b="1" i="1" spc="-1" dirty="0">
+                <a:solidFill>
+                  <a:srgbClr val="FFFFFF"/>
+                </a:solidFill>
+                <a:latin typeface="Avenir Next LT Pro Light"/>
+              </a:rPr>
+              <a:t>;</a:t>
+            </a:r>
+            <a:endParaRPr lang="pt-BR" sz="2800" b="1" i="1" strike="noStrike" spc="-1" dirty="0">
+              <a:solidFill>
+                <a:srgbClr val="FFFFFF"/>
+              </a:solidFill>
+              <a:latin typeface="Avenir Next LT Pro Light"/>
+            </a:endParaRPr>
+          </a:p>
+          <a:p>
+            <a:pPr marL="457200" indent="-457200">
+              <a:buFont typeface="Wingdings" panose="05000000000000000000" pitchFamily="2" charset="2"/>
+              <a:buChar char="q"/>
+            </a:pPr>
+            <a:r>
+              <a:rPr lang="pt-BR" sz="2800" spc="-1" dirty="0">
+                <a:solidFill>
+                  <a:srgbClr val="FFFFFF"/>
+                </a:solidFill>
+                <a:latin typeface="Avenir Next LT Pro Light"/>
+              </a:rPr>
+              <a:t>Organização do fluxo de caixa diário;</a:t>
+            </a:r>
+          </a:p>
+          <a:p>
+            <a:pPr marL="457200" indent="-457200">
+              <a:buFont typeface="Wingdings" panose="05000000000000000000" pitchFamily="2" charset="2"/>
+              <a:buChar char="q"/>
+            </a:pPr>
+            <a:r>
+              <a:rPr lang="pt-BR" sz="2800" strike="noStrike" spc="-1" dirty="0">
+                <a:solidFill>
+                  <a:srgbClr val="FFFFFF"/>
+                </a:solidFill>
+                <a:latin typeface="Avenir Next LT Pro Light"/>
+              </a:rPr>
+              <a:t>Controle dos pedidos na palma da mão;</a:t>
+            </a:r>
+          </a:p>
+          <a:p>
+            <a:pPr marL="457200" indent="-457200">
+              <a:buFont typeface="Wingdings" panose="05000000000000000000" pitchFamily="2" charset="2"/>
+              <a:buChar char="q"/>
+            </a:pPr>
+            <a:r>
+              <a:rPr lang="pt-BR" sz="2800" spc="-1" dirty="0">
+                <a:solidFill>
+                  <a:srgbClr val="FFFFFF"/>
+                </a:solidFill>
+                <a:latin typeface="Avenir Next LT Pro Light"/>
+              </a:rPr>
+              <a:t>Monitoramento de qualquer lugar;</a:t>
+            </a:r>
+          </a:p>
+          <a:p>
+            <a:pPr marL="457200" indent="-457200">
+              <a:buFont typeface="Wingdings" panose="05000000000000000000" pitchFamily="2" charset="2"/>
+              <a:buChar char="q"/>
+            </a:pPr>
+            <a:r>
+              <a:rPr lang="pt-BR" sz="2800" spc="-1" dirty="0">
+                <a:solidFill>
+                  <a:srgbClr val="FFFFFF"/>
+                </a:solidFill>
+                <a:latin typeface="Avenir Next LT Pro Light"/>
+              </a:rPr>
+              <a:t>Disponível para PC, IOS e Android.</a:t>
+            </a:r>
+          </a:p>
+        </p:txBody>
+      </p:sp>
+      <p:pic>
+        <p:nvPicPr>
+          <p:cNvPr id="3" name="Imagem 2">
+            <a:extLst>
+              <a:ext uri="{FF2B5EF4-FFF2-40B4-BE49-F238E27FC236}">
+                <a16:creationId xmlns:a16="http://schemas.microsoft.com/office/drawing/2014/main" id="{484E84D8-632D-4C53-8430-D65261A3C5F3}"/>
+              </a:ext>
+            </a:extLst>
+          </p:cNvPr>
+          <p:cNvPicPr>
+            <a:picLocks noChangeAspect="1"/>
+          </p:cNvPicPr>
+          <p:nvPr/>
+        </p:nvPicPr>
+        <p:blipFill rotWithShape="1">
+          <a:blip r:embed="rId2"/>
+          <a:srcRect l="52665" t="5117" r="2036" b="5330"/>
+          <a:stretch/>
+        </p:blipFill>
+        <p:spPr>
+          <a:xfrm>
+            <a:off x="9379244" y="136800"/>
+            <a:ext cx="2577272" cy="2866030"/>
+          </a:xfrm>
+          <a:prstGeom prst="rect">
+            <a:avLst/>
+          </a:prstGeom>
+        </p:spPr>
+      </p:pic>
     </p:spTree>
   </p:cSld>
   <p:clrMapOvr>

</xml_diff>